<commit_message>
Final draft of my defense ppt.
</commit_message>
<xml_diff>
--- a/Diploma paper/Figures.pptx
+++ b/Diploma paper/Figures.pptx
@@ -198,7 +198,6 @@
           </a:p>
         </c:rich>
       </c:tx>
-      <c:layout/>
       <c:overlay val="0"/>
       <c:spPr>
         <a:noFill/>
@@ -708,7 +707,6 @@
     </c:plotArea>
     <c:legend>
       <c:legendPos val="b"/>
-      <c:layout/>
       <c:overlay val="0"/>
       <c:spPr>
         <a:noFill/>
@@ -1390,7 +1388,7 @@
           <a:p>
             <a:fld id="{A43A1234-6667-4DE0-865A-9C5BC084BE07}" type="datetimeFigureOut">
               <a:rPr lang="zh-CN" altLang="en-US" smtClean="0"/>
-              <a:t>2016/1/3</a:t>
+              <a:t>2016/1/11</a:t>
             </a:fld>
             <a:endParaRPr lang="zh-CN" altLang="en-US"/>
           </a:p>
@@ -1975,7 +1973,7 @@
           <a:p>
             <a:fld id="{2F9DF95A-80B2-48A9-AE83-225FFA8B48F6}" type="datetimeFigureOut">
               <a:rPr lang="zh-CN" altLang="en-US" smtClean="0"/>
-              <a:t>2016/1/3</a:t>
+              <a:t>2016/1/11</a:t>
             </a:fld>
             <a:endParaRPr lang="zh-CN" altLang="en-US"/>
           </a:p>
@@ -2145,7 +2143,7 @@
           <a:p>
             <a:fld id="{2F9DF95A-80B2-48A9-AE83-225FFA8B48F6}" type="datetimeFigureOut">
               <a:rPr lang="zh-CN" altLang="en-US" smtClean="0"/>
-              <a:t>2016/1/3</a:t>
+              <a:t>2016/1/11</a:t>
             </a:fld>
             <a:endParaRPr lang="zh-CN" altLang="en-US"/>
           </a:p>
@@ -2325,7 +2323,7 @@
           <a:p>
             <a:fld id="{2F9DF95A-80B2-48A9-AE83-225FFA8B48F6}" type="datetimeFigureOut">
               <a:rPr lang="zh-CN" altLang="en-US" smtClean="0"/>
-              <a:t>2016/1/3</a:t>
+              <a:t>2016/1/11</a:t>
             </a:fld>
             <a:endParaRPr lang="zh-CN" altLang="en-US"/>
           </a:p>
@@ -2495,7 +2493,7 @@
           <a:p>
             <a:fld id="{2F9DF95A-80B2-48A9-AE83-225FFA8B48F6}" type="datetimeFigureOut">
               <a:rPr lang="zh-CN" altLang="en-US" smtClean="0"/>
-              <a:t>2016/1/3</a:t>
+              <a:t>2016/1/11</a:t>
             </a:fld>
             <a:endParaRPr lang="zh-CN" altLang="en-US"/>
           </a:p>
@@ -2741,7 +2739,7 @@
           <a:p>
             <a:fld id="{2F9DF95A-80B2-48A9-AE83-225FFA8B48F6}" type="datetimeFigureOut">
               <a:rPr lang="zh-CN" altLang="en-US" smtClean="0"/>
-              <a:t>2016/1/3</a:t>
+              <a:t>2016/1/11</a:t>
             </a:fld>
             <a:endParaRPr lang="zh-CN" altLang="en-US"/>
           </a:p>
@@ -2973,7 +2971,7 @@
           <a:p>
             <a:fld id="{2F9DF95A-80B2-48A9-AE83-225FFA8B48F6}" type="datetimeFigureOut">
               <a:rPr lang="zh-CN" altLang="en-US" smtClean="0"/>
-              <a:t>2016/1/3</a:t>
+              <a:t>2016/1/11</a:t>
             </a:fld>
             <a:endParaRPr lang="zh-CN" altLang="en-US"/>
           </a:p>
@@ -3340,7 +3338,7 @@
           <a:p>
             <a:fld id="{2F9DF95A-80B2-48A9-AE83-225FFA8B48F6}" type="datetimeFigureOut">
               <a:rPr lang="zh-CN" altLang="en-US" smtClean="0"/>
-              <a:t>2016/1/3</a:t>
+              <a:t>2016/1/11</a:t>
             </a:fld>
             <a:endParaRPr lang="zh-CN" altLang="en-US"/>
           </a:p>
@@ -3458,7 +3456,7 @@
           <a:p>
             <a:fld id="{2F9DF95A-80B2-48A9-AE83-225FFA8B48F6}" type="datetimeFigureOut">
               <a:rPr lang="zh-CN" altLang="en-US" smtClean="0"/>
-              <a:t>2016/1/3</a:t>
+              <a:t>2016/1/11</a:t>
             </a:fld>
             <a:endParaRPr lang="zh-CN" altLang="en-US"/>
           </a:p>
@@ -3553,7 +3551,7 @@
           <a:p>
             <a:fld id="{2F9DF95A-80B2-48A9-AE83-225FFA8B48F6}" type="datetimeFigureOut">
               <a:rPr lang="zh-CN" altLang="en-US" smtClean="0"/>
-              <a:t>2016/1/3</a:t>
+              <a:t>2016/1/11</a:t>
             </a:fld>
             <a:endParaRPr lang="zh-CN" altLang="en-US"/>
           </a:p>
@@ -3830,7 +3828,7 @@
           <a:p>
             <a:fld id="{2F9DF95A-80B2-48A9-AE83-225FFA8B48F6}" type="datetimeFigureOut">
               <a:rPr lang="zh-CN" altLang="en-US" smtClean="0"/>
-              <a:t>2016/1/3</a:t>
+              <a:t>2016/1/11</a:t>
             </a:fld>
             <a:endParaRPr lang="zh-CN" altLang="en-US"/>
           </a:p>
@@ -4083,7 +4081,7 @@
           <a:p>
             <a:fld id="{2F9DF95A-80B2-48A9-AE83-225FFA8B48F6}" type="datetimeFigureOut">
               <a:rPr lang="zh-CN" altLang="en-US" smtClean="0"/>
-              <a:t>2016/1/3</a:t>
+              <a:t>2016/1/11</a:t>
             </a:fld>
             <a:endParaRPr lang="zh-CN" altLang="en-US"/>
           </a:p>
@@ -4296,7 +4294,7 @@
           <a:p>
             <a:fld id="{2F9DF95A-80B2-48A9-AE83-225FFA8B48F6}" type="datetimeFigureOut">
               <a:rPr lang="zh-CN" altLang="en-US" smtClean="0"/>
-              <a:t>2016/1/3</a:t>
+              <a:t>2016/1/11</a:t>
             </a:fld>
             <a:endParaRPr lang="zh-CN" altLang="en-US"/>
           </a:p>
@@ -13650,6 +13648,243 @@
           </a:p>
         </p:txBody>
       </p:sp>
+      <p:sp>
+        <p:nvSpPr>
+          <p:cNvPr id="50" name="文本框 49"/>
+          <p:cNvSpPr txBox="1"/>
+          <p:nvPr/>
+        </p:nvSpPr>
+        <p:spPr>
+          <a:xfrm>
+            <a:off x="9216631" y="5976925"/>
+            <a:ext cx="2125529" cy="246221"/>
+          </a:xfrm>
+          <a:prstGeom prst="rect">
+            <a:avLst/>
+          </a:prstGeom>
+          <a:noFill/>
+        </p:spPr>
+        <p:txBody>
+          <a:bodyPr wrap="square" rtlCol="0">
+            <a:spAutoFit/>
+          </a:bodyPr>
+          <a:lstStyle/>
+          <a:p>
+            <a:r>
+              <a:rPr lang="zh-CN" altLang="en-US" sz="1000" dirty="0" smtClean="0"/>
+              <a:t>应用服务</a:t>
+            </a:r>
+            <a:endParaRPr lang="zh-CN" altLang="en-US" sz="1000" dirty="0"/>
+          </a:p>
+        </p:txBody>
+      </p:sp>
+      <p:sp>
+        <p:nvSpPr>
+          <p:cNvPr id="51" name="圆角矩形 50"/>
+          <p:cNvSpPr/>
+          <p:nvPr/>
+        </p:nvSpPr>
+        <p:spPr>
+          <a:xfrm>
+            <a:off x="8701923" y="5283111"/>
+            <a:ext cx="1939942" cy="978720"/>
+          </a:xfrm>
+          <a:prstGeom prst="roundRect">
+            <a:avLst/>
+          </a:prstGeom>
+          <a:noFill/>
+          <a:ln w="25400">
+            <a:solidFill>
+              <a:schemeClr val="bg2">
+                <a:lumMod val="75000"/>
+              </a:schemeClr>
+            </a:solidFill>
+            <a:prstDash val="solid"/>
+          </a:ln>
+        </p:spPr>
+        <p:style>
+          <a:lnRef idx="2">
+            <a:schemeClr val="accent1">
+              <a:shade val="50000"/>
+            </a:schemeClr>
+          </a:lnRef>
+          <a:fillRef idx="1">
+            <a:schemeClr val="accent1"/>
+          </a:fillRef>
+          <a:effectRef idx="0">
+            <a:schemeClr val="accent1"/>
+          </a:effectRef>
+          <a:fontRef idx="minor">
+            <a:schemeClr val="lt1"/>
+          </a:fontRef>
+        </p:style>
+        <p:txBody>
+          <a:bodyPr rtlCol="0" anchor="ctr"/>
+          <a:lstStyle/>
+          <a:p>
+            <a:pPr algn="ctr"/>
+            <a:endParaRPr lang="zh-CN" altLang="en-US"/>
+          </a:p>
+        </p:txBody>
+      </p:sp>
+      <p:pic>
+        <p:nvPicPr>
+          <p:cNvPr id="53" name="图片 52"/>
+          <p:cNvPicPr>
+            <a:picLocks noChangeAspect="1"/>
+          </p:cNvPicPr>
+          <p:nvPr/>
+        </p:nvPicPr>
+        <p:blipFill>
+          <a:blip r:embed="rId4" cstate="print">
+            <a:extLst>
+              <a:ext uri="{28A0092B-C50C-407E-A947-70E740481C1C}">
+                <a14:useLocalDpi xmlns:a14="http://schemas.microsoft.com/office/drawing/2010/main" val="0"/>
+              </a:ext>
+            </a:extLst>
+          </a:blip>
+          <a:stretch>
+            <a:fillRect/>
+          </a:stretch>
+        </p:blipFill>
+        <p:spPr>
+          <a:xfrm>
+            <a:off x="9040412" y="5397603"/>
+            <a:ext cx="352439" cy="543931"/>
+          </a:xfrm>
+          <a:prstGeom prst="rect">
+            <a:avLst/>
+          </a:prstGeom>
+        </p:spPr>
+      </p:pic>
+      <p:pic>
+        <p:nvPicPr>
+          <p:cNvPr id="54" name="图片 53"/>
+          <p:cNvPicPr>
+            <a:picLocks noChangeAspect="1"/>
+          </p:cNvPicPr>
+          <p:nvPr/>
+        </p:nvPicPr>
+        <p:blipFill>
+          <a:blip r:embed="rId4" cstate="print">
+            <a:extLst>
+              <a:ext uri="{28A0092B-C50C-407E-A947-70E740481C1C}">
+                <a14:useLocalDpi xmlns:a14="http://schemas.microsoft.com/office/drawing/2010/main" val="0"/>
+              </a:ext>
+            </a:extLst>
+          </a:blip>
+          <a:stretch>
+            <a:fillRect/>
+          </a:stretch>
+        </p:blipFill>
+        <p:spPr>
+          <a:xfrm>
+            <a:off x="9462013" y="5394309"/>
+            <a:ext cx="352439" cy="543931"/>
+          </a:xfrm>
+          <a:prstGeom prst="rect">
+            <a:avLst/>
+          </a:prstGeom>
+        </p:spPr>
+      </p:pic>
+      <p:pic>
+        <p:nvPicPr>
+          <p:cNvPr id="55" name="图片 54"/>
+          <p:cNvPicPr>
+            <a:picLocks noChangeAspect="1"/>
+          </p:cNvPicPr>
+          <p:nvPr/>
+        </p:nvPicPr>
+        <p:blipFill>
+          <a:blip r:embed="rId4" cstate="print">
+            <a:extLst>
+              <a:ext uri="{28A0092B-C50C-407E-A947-70E740481C1C}">
+                <a14:useLocalDpi xmlns:a14="http://schemas.microsoft.com/office/drawing/2010/main" val="0"/>
+              </a:ext>
+            </a:extLst>
+          </a:blip>
+          <a:stretch>
+            <a:fillRect/>
+          </a:stretch>
+        </p:blipFill>
+        <p:spPr>
+          <a:xfrm>
+            <a:off x="9907559" y="5378555"/>
+            <a:ext cx="352439" cy="543931"/>
+          </a:xfrm>
+          <a:prstGeom prst="rect">
+            <a:avLst/>
+          </a:prstGeom>
+        </p:spPr>
+      </p:pic>
+      <p:cxnSp>
+        <p:nvCxnSpPr>
+          <p:cNvPr id="56" name="直接箭头连接符 55"/>
+          <p:cNvCxnSpPr/>
+          <p:nvPr/>
+        </p:nvCxnSpPr>
+        <p:spPr>
+          <a:xfrm>
+            <a:off x="6480268" y="4141140"/>
+            <a:ext cx="2221655" cy="1141971"/>
+          </a:xfrm>
+          <a:prstGeom prst="straightConnector1">
+            <a:avLst/>
+          </a:prstGeom>
+          <a:ln w="28575">
+            <a:solidFill>
+              <a:schemeClr val="accent1">
+                <a:lumMod val="75000"/>
+              </a:schemeClr>
+            </a:solidFill>
+            <a:tailEnd type="triangle"/>
+          </a:ln>
+        </p:spPr>
+        <p:style>
+          <a:lnRef idx="1">
+            <a:schemeClr val="accent1"/>
+          </a:lnRef>
+          <a:fillRef idx="0">
+            <a:schemeClr val="accent1"/>
+          </a:fillRef>
+          <a:effectRef idx="0">
+            <a:schemeClr val="accent1"/>
+          </a:effectRef>
+          <a:fontRef idx="minor">
+            <a:schemeClr val="tx1"/>
+          </a:fontRef>
+        </p:style>
+      </p:cxnSp>
+      <p:sp>
+        <p:nvSpPr>
+          <p:cNvPr id="59" name="文本框 58"/>
+          <p:cNvSpPr txBox="1"/>
+          <p:nvPr/>
+        </p:nvSpPr>
+        <p:spPr>
+          <a:xfrm rot="1568954">
+            <a:off x="6827975" y="4471994"/>
+            <a:ext cx="1786951" cy="246221"/>
+          </a:xfrm>
+          <a:prstGeom prst="rect">
+            <a:avLst/>
+          </a:prstGeom>
+          <a:noFill/>
+        </p:spPr>
+        <p:txBody>
+          <a:bodyPr wrap="square" rtlCol="0">
+            <a:spAutoFit/>
+          </a:bodyPr>
+          <a:lstStyle/>
+          <a:p>
+            <a:r>
+              <a:rPr lang="zh-CN" altLang="en-US" sz="1000" dirty="0" smtClean="0"/>
+              <a:t>应用服务请求转发</a:t>
+            </a:r>
+            <a:endParaRPr lang="zh-CN" altLang="en-US" sz="1000" dirty="0"/>
+          </a:p>
+        </p:txBody>
+      </p:sp>
     </p:spTree>
     <p:extLst>
       <p:ext uri="{BB962C8B-B14F-4D97-AF65-F5344CB8AC3E}">
@@ -25141,7 +25376,7 @@
       </p:pic>
       <p:pic>
         <p:nvPicPr>
-          <p:cNvPr id="5" name="图片 4"/>
+          <p:cNvPr id="6" name="图片 5"/>
           <p:cNvPicPr>
             <a:picLocks noChangeAspect="1"/>
           </p:cNvPicPr>

</xml_diff>